<commit_message>
Fixing broken image on QPE kata.
</commit_message>
<xml_diff>
--- a/Slides.pptx
+++ b/Slides.pptx
@@ -26,7 +26,8 @@
     <p:sldId id="277" r:id="rId20"/>
     <p:sldId id="276" r:id="rId21"/>
     <p:sldId id="263" r:id="rId22"/>
-    <p:sldId id="264" r:id="rId23"/>
+    <p:sldId id="279" r:id="rId23"/>
+    <p:sldId id="264" r:id="rId24"/>
   </p:sldIdLst>
   <p:sldSz cx="12192000" cy="6858000"/>
   <p:notesSz cx="6858000" cy="9144000"/>
@@ -361,7 +362,7 @@
           <a:p>
             <a:fld id="{310C756B-8D03-4FDF-9B4F-01CAEE5F470D}" type="datetimeFigureOut">
               <a:rPr lang="en-US" smtClean="0"/>
-              <a:t>9/25/2019</a:t>
+              <a:t>9/26/2019</a:t>
             </a:fld>
             <a:endParaRPr lang="en-US"/>
           </a:p>
@@ -569,7 +570,7 @@
           <a:p>
             <a:fld id="{310C756B-8D03-4FDF-9B4F-01CAEE5F470D}" type="datetimeFigureOut">
               <a:rPr lang="en-US" smtClean="0"/>
-              <a:t>9/25/2019</a:t>
+              <a:t>9/26/2019</a:t>
             </a:fld>
             <a:endParaRPr lang="en-US"/>
           </a:p>
@@ -827,7 +828,7 @@
           <a:p>
             <a:fld id="{310C756B-8D03-4FDF-9B4F-01CAEE5F470D}" type="datetimeFigureOut">
               <a:rPr lang="en-US" smtClean="0"/>
-              <a:t>9/25/2019</a:t>
+              <a:t>9/26/2019</a:t>
             </a:fld>
             <a:endParaRPr lang="en-US"/>
           </a:p>
@@ -997,7 +998,7 @@
           <a:p>
             <a:fld id="{310C756B-8D03-4FDF-9B4F-01CAEE5F470D}" type="datetimeFigureOut">
               <a:rPr lang="en-US" smtClean="0"/>
-              <a:t>9/25/2019</a:t>
+              <a:t>9/26/2019</a:t>
             </a:fld>
             <a:endParaRPr lang="en-US"/>
           </a:p>
@@ -1334,7 +1335,7 @@
           <a:p>
             <a:fld id="{310C756B-8D03-4FDF-9B4F-01CAEE5F470D}" type="datetimeFigureOut">
               <a:rPr lang="en-US" smtClean="0"/>
-              <a:t>9/25/2019</a:t>
+              <a:t>9/26/2019</a:t>
             </a:fld>
             <a:endParaRPr lang="en-US"/>
           </a:p>
@@ -1609,7 +1610,7 @@
           <a:p>
             <a:fld id="{310C756B-8D03-4FDF-9B4F-01CAEE5F470D}" type="datetimeFigureOut">
               <a:rPr lang="en-US" smtClean="0"/>
-              <a:t>9/25/2019</a:t>
+              <a:t>9/26/2019</a:t>
             </a:fld>
             <a:endParaRPr lang="en-US"/>
           </a:p>
@@ -1992,7 +1993,7 @@
           <a:p>
             <a:fld id="{310C756B-8D03-4FDF-9B4F-01CAEE5F470D}" type="datetimeFigureOut">
               <a:rPr lang="en-US" smtClean="0"/>
-              <a:t>9/25/2019</a:t>
+              <a:t>9/26/2019</a:t>
             </a:fld>
             <a:endParaRPr lang="en-US"/>
           </a:p>
@@ -2110,7 +2111,7 @@
           <a:p>
             <a:fld id="{310C756B-8D03-4FDF-9B4F-01CAEE5F470D}" type="datetimeFigureOut">
               <a:rPr lang="en-US" smtClean="0"/>
-              <a:t>9/25/2019</a:t>
+              <a:t>9/26/2019</a:t>
             </a:fld>
             <a:endParaRPr lang="en-US"/>
           </a:p>
@@ -2283,7 +2284,7 @@
           <a:p>
             <a:fld id="{310C756B-8D03-4FDF-9B4F-01CAEE5F470D}" type="datetimeFigureOut">
               <a:rPr lang="en-US" smtClean="0"/>
-              <a:t>9/25/2019</a:t>
+              <a:t>9/26/2019</a:t>
             </a:fld>
             <a:endParaRPr lang="en-US"/>
           </a:p>
@@ -2639,7 +2640,7 @@
           <a:p>
             <a:fld id="{310C756B-8D03-4FDF-9B4F-01CAEE5F470D}" type="datetimeFigureOut">
               <a:rPr lang="en-US" smtClean="0"/>
-              <a:t>9/25/2019</a:t>
+              <a:t>9/26/2019</a:t>
             </a:fld>
             <a:endParaRPr lang="en-US"/>
           </a:p>
@@ -2987,7 +2988,7 @@
           <a:p>
             <a:fld id="{310C756B-8D03-4FDF-9B4F-01CAEE5F470D}" type="datetimeFigureOut">
               <a:rPr lang="en-US" smtClean="0"/>
-              <a:t>9/25/2019</a:t>
+              <a:t>9/26/2019</a:t>
             </a:fld>
             <a:endParaRPr lang="en-US"/>
           </a:p>
@@ -3298,7 +3299,7 @@
           <a:p>
             <a:fld id="{310C756B-8D03-4FDF-9B4F-01CAEE5F470D}" type="datetimeFigureOut">
               <a:rPr lang="en-US" smtClean="0"/>
-              <a:t>9/25/2019</a:t>
+              <a:t>9/26/2019</a:t>
             </a:fld>
             <a:endParaRPr lang="en-US"/>
           </a:p>
@@ -9771,6 +9772,66 @@
           <a:chExt cx="0" cy="0"/>
         </a:xfrm>
       </p:grpSpPr>
+      <p:pic>
+        <p:nvPicPr>
+          <p:cNvPr id="4" name="Picture 3">
+            <a:extLst>
+              <a:ext uri="{FF2B5EF4-FFF2-40B4-BE49-F238E27FC236}">
+                <a16:creationId xmlns:a16="http://schemas.microsoft.com/office/drawing/2014/main" id="{78A89CDF-1450-4039-B10E-803DCF222491}"/>
+              </a:ext>
+            </a:extLst>
+          </p:cNvPr>
+          <p:cNvPicPr>
+            <a:picLocks noChangeAspect="1"/>
+          </p:cNvPicPr>
+          <p:nvPr/>
+        </p:nvPicPr>
+        <p:blipFill>
+          <a:blip r:embed="rId2"/>
+          <a:stretch>
+            <a:fillRect/>
+          </a:stretch>
+        </p:blipFill>
+        <p:spPr>
+          <a:xfrm>
+            <a:off x="1643626" y="658513"/>
+            <a:ext cx="8904747" cy="5540974"/>
+          </a:xfrm>
+          <a:prstGeom prst="rect">
+            <a:avLst/>
+          </a:prstGeom>
+        </p:spPr>
+      </p:pic>
+    </p:spTree>
+    <p:extLst>
+      <p:ext uri="{BB962C8B-B14F-4D97-AF65-F5344CB8AC3E}">
+        <p14:creationId xmlns:p14="http://schemas.microsoft.com/office/powerpoint/2010/main" val="1598754662"/>
+      </p:ext>
+    </p:extLst>
+  </p:cSld>
+  <p:clrMapOvr>
+    <a:masterClrMapping/>
+  </p:clrMapOvr>
+</p:sld>
+</file>
+
+<file path=ppt/slides/slide23.xml><?xml version="1.0" encoding="utf-8"?>
+<p:sld xmlns:a="http://schemas.openxmlformats.org/drawingml/2006/main" xmlns:r="http://schemas.openxmlformats.org/officeDocument/2006/relationships" xmlns:p="http://schemas.openxmlformats.org/presentationml/2006/main">
+  <p:cSld>
+    <p:spTree>
+      <p:nvGrpSpPr>
+        <p:cNvPr id="1" name=""/>
+        <p:cNvGrpSpPr/>
+        <p:nvPr/>
+      </p:nvGrpSpPr>
+      <p:grpSpPr>
+        <a:xfrm>
+          <a:off x="0" y="0"/>
+          <a:ext cx="0" cy="0"/>
+          <a:chOff x="0" y="0"/>
+          <a:chExt cx="0" cy="0"/>
+        </a:xfrm>
+      </p:grpSpPr>
       <p:sp>
         <p:nvSpPr>
           <p:cNvPr id="2" name="Title 1">

</xml_diff>

<commit_message>
Adding github links to slides.
</commit_message>
<xml_diff>
--- a/Slides.pptx
+++ b/Slides.pptx
@@ -25,9 +25,12 @@
     <p:sldId id="262" r:id="rId19"/>
     <p:sldId id="277" r:id="rId20"/>
     <p:sldId id="276" r:id="rId21"/>
-    <p:sldId id="263" r:id="rId22"/>
-    <p:sldId id="279" r:id="rId23"/>
-    <p:sldId id="264" r:id="rId24"/>
+    <p:sldId id="280" r:id="rId22"/>
+    <p:sldId id="281" r:id="rId23"/>
+    <p:sldId id="263" r:id="rId24"/>
+    <p:sldId id="279" r:id="rId25"/>
+    <p:sldId id="264" r:id="rId26"/>
+    <p:sldId id="282" r:id="rId27"/>
   </p:sldIdLst>
   <p:sldSz cx="12192000" cy="6858000"/>
   <p:notesSz cx="6858000" cy="9144000"/>
@@ -9171,10 +9174,1072 @@
           <p:nvPr>
             <p:extLst>
               <p:ext uri="{D42A27DB-BD31-4B8C-83A1-F6EECF244321}">
-                <p14:modId xmlns:p14="http://schemas.microsoft.com/office/powerpoint/2010/main" val="2661674565"/>
+                <p14:modId xmlns:p14="http://schemas.microsoft.com/office/powerpoint/2010/main" val="1290338927"/>
               </p:ext>
             </p:extLst>
           </p:nvPr>
+        </p:nvGraphicFramePr>
+        <p:xfrm>
+          <a:off x="1097280" y="1961726"/>
+          <a:ext cx="10058400" cy="3354847"/>
+        </p:xfrm>
+        <a:graphic>
+          <a:graphicData uri="http://schemas.openxmlformats.org/drawingml/2006/table">
+            <a:tbl>
+              <a:tblPr firstRow="1" bandRow="1">
+                <a:tableStyleId>{9D7B26C5-4107-4FEC-AEDC-1716B250A1EF}</a:tableStyleId>
+              </a:tblPr>
+              <a:tblGrid>
+                <a:gridCol w="2514600">
+                  <a:extLst>
+                    <a:ext uri="{9D8B030D-6E8A-4147-A177-3AD203B41FA5}">
+                      <a16:colId xmlns:a16="http://schemas.microsoft.com/office/drawing/2014/main" val="85520031"/>
+                    </a:ext>
+                  </a:extLst>
+                </a:gridCol>
+                <a:gridCol w="2514600">
+                  <a:extLst>
+                    <a:ext uri="{9D8B030D-6E8A-4147-A177-3AD203B41FA5}">
+                      <a16:colId xmlns:a16="http://schemas.microsoft.com/office/drawing/2014/main" val="1803248223"/>
+                    </a:ext>
+                  </a:extLst>
+                </a:gridCol>
+                <a:gridCol w="2514600">
+                  <a:extLst>
+                    <a:ext uri="{9D8B030D-6E8A-4147-A177-3AD203B41FA5}">
+                      <a16:colId xmlns:a16="http://schemas.microsoft.com/office/drawing/2014/main" val="3792684937"/>
+                    </a:ext>
+                  </a:extLst>
+                </a:gridCol>
+                <a:gridCol w="2514600">
+                  <a:extLst>
+                    <a:ext uri="{9D8B030D-6E8A-4147-A177-3AD203B41FA5}">
+                      <a16:colId xmlns:a16="http://schemas.microsoft.com/office/drawing/2014/main" val="101123046"/>
+                    </a:ext>
+                  </a:extLst>
+                </a:gridCol>
+              </a:tblGrid>
+              <a:tr h="748425">
+                <a:tc>
+                  <a:txBody>
+                    <a:bodyPr/>
+                    <a:lstStyle/>
+                    <a:p>
+                      <a:endParaRPr lang="en-US" dirty="0"/>
+                    </a:p>
+                  </a:txBody>
+                  <a:tcPr/>
+                </a:tc>
+                <a:tc>
+                  <a:txBody>
+                    <a:bodyPr/>
+                    <a:lstStyle/>
+                    <a:p>
+                      <a:pPr algn="ctr"/>
+                      <a:r>
+                        <a:rPr lang="en-US" dirty="0"/>
+                        <a:t>Circuits</a:t>
+                      </a:r>
+                    </a:p>
+                  </a:txBody>
+                  <a:tcPr/>
+                </a:tc>
+                <a:tc>
+                  <a:txBody>
+                    <a:bodyPr/>
+                    <a:lstStyle/>
+                    <a:p>
+                      <a:pPr algn="ctr"/>
+                      <a:endParaRPr lang="en-US" dirty="0"/>
+                    </a:p>
+                  </a:txBody>
+                  <a:tcPr/>
+                </a:tc>
+                <a:tc>
+                  <a:txBody>
+                    <a:bodyPr/>
+                    <a:lstStyle/>
+                    <a:p>
+                      <a:pPr algn="ctr"/>
+                      <a:endParaRPr lang="en-US" dirty="0"/>
+                    </a:p>
+                  </a:txBody>
+                  <a:tcPr/>
+                </a:tc>
+                <a:extLst>
+                  <a:ext uri="{0D108BD9-81ED-4DB2-BD59-A6C34878D82A}">
+                    <a16:rowId xmlns:a16="http://schemas.microsoft.com/office/drawing/2014/main" val="2277476467"/>
+                  </a:ext>
+                </a:extLst>
+              </a:tr>
+              <a:tr h="748425">
+                <a:tc>
+                  <a:txBody>
+                    <a:bodyPr/>
+                    <a:lstStyle/>
+                    <a:p>
+                      <a:pPr marL="0" marR="0" lvl="0" indent="0" algn="l" defTabSz="914400" rtl="0" eaLnBrk="1" fontAlgn="auto" latinLnBrk="0" hangingPunct="1">
+                        <a:lnSpc>
+                          <a:spcPct val="100000"/>
+                        </a:lnSpc>
+                        <a:spcBef>
+                          <a:spcPts val="0"/>
+                        </a:spcBef>
+                        <a:spcAft>
+                          <a:spcPts val="0"/>
+                        </a:spcAft>
+                        <a:buClrTx/>
+                        <a:buSzTx/>
+                        <a:buFontTx/>
+                        <a:buNone/>
+                        <a:tabLst/>
+                        <a:defRPr/>
+                      </a:pPr>
+                      <a:r>
+                        <a:rPr lang="en-US" dirty="0"/>
+                        <a:t>Expressing Computation</a:t>
+                      </a:r>
+                    </a:p>
+                  </a:txBody>
+                  <a:tcPr/>
+                </a:tc>
+                <a:tc>
+                  <a:txBody>
+                    <a:bodyPr/>
+                    <a:lstStyle/>
+                    <a:p>
+                      <a:pPr algn="ctr"/>
+                      <a:r>
+                        <a:rPr lang="en-US" dirty="0"/>
+                        <a:t>X</a:t>
+                      </a:r>
+                    </a:p>
+                  </a:txBody>
+                  <a:tcPr/>
+                </a:tc>
+                <a:tc>
+                  <a:txBody>
+                    <a:bodyPr/>
+                    <a:lstStyle/>
+                    <a:p>
+                      <a:pPr algn="ctr"/>
+                      <a:endParaRPr lang="en-US" dirty="0"/>
+                    </a:p>
+                  </a:txBody>
+                  <a:tcPr/>
+                </a:tc>
+                <a:tc>
+                  <a:txBody>
+                    <a:bodyPr/>
+                    <a:lstStyle/>
+                    <a:p>
+                      <a:pPr algn="ctr"/>
+                      <a:endParaRPr lang="en-US" dirty="0"/>
+                    </a:p>
+                  </a:txBody>
+                  <a:tcPr/>
+                </a:tc>
+                <a:extLst>
+                  <a:ext uri="{0D108BD9-81ED-4DB2-BD59-A6C34878D82A}">
+                    <a16:rowId xmlns:a16="http://schemas.microsoft.com/office/drawing/2014/main" val="2203355882"/>
+                  </a:ext>
+                </a:extLst>
+              </a:tr>
+              <a:tr h="557164">
+                <a:tc>
+                  <a:txBody>
+                    <a:bodyPr/>
+                    <a:lstStyle/>
+                    <a:p>
+                      <a:pPr marL="0" marR="0" lvl="0" indent="0" algn="l" defTabSz="914400" rtl="0" eaLnBrk="1" fontAlgn="auto" latinLnBrk="0" hangingPunct="1">
+                        <a:lnSpc>
+                          <a:spcPct val="100000"/>
+                        </a:lnSpc>
+                        <a:spcBef>
+                          <a:spcPts val="0"/>
+                        </a:spcBef>
+                        <a:spcAft>
+                          <a:spcPts val="0"/>
+                        </a:spcAft>
+                        <a:buClrTx/>
+                        <a:buSzTx/>
+                        <a:buFontTx/>
+                        <a:buNone/>
+                        <a:tabLst/>
+                        <a:defRPr/>
+                      </a:pPr>
+                      <a:r>
+                        <a:rPr lang="en-US" dirty="0"/>
+                        <a:t>Parameters</a:t>
+                      </a:r>
+                    </a:p>
+                  </a:txBody>
+                  <a:tcPr/>
+                </a:tc>
+                <a:tc>
+                  <a:txBody>
+                    <a:bodyPr/>
+                    <a:lstStyle/>
+                    <a:p>
+                      <a:pPr algn="ctr"/>
+                      <a:endParaRPr lang="en-US"/>
+                    </a:p>
+                  </a:txBody>
+                  <a:tcPr/>
+                </a:tc>
+                <a:tc>
+                  <a:txBody>
+                    <a:bodyPr/>
+                    <a:lstStyle/>
+                    <a:p>
+                      <a:pPr algn="ctr"/>
+                      <a:endParaRPr lang="en-US" dirty="0"/>
+                    </a:p>
+                  </a:txBody>
+                  <a:tcPr/>
+                </a:tc>
+                <a:tc>
+                  <a:txBody>
+                    <a:bodyPr/>
+                    <a:lstStyle/>
+                    <a:p>
+                      <a:pPr algn="ctr"/>
+                      <a:endParaRPr lang="en-US" dirty="0"/>
+                    </a:p>
+                  </a:txBody>
+                  <a:tcPr/>
+                </a:tc>
+                <a:extLst>
+                  <a:ext uri="{0D108BD9-81ED-4DB2-BD59-A6C34878D82A}">
+                    <a16:rowId xmlns:a16="http://schemas.microsoft.com/office/drawing/2014/main" val="2482598920"/>
+                  </a:ext>
+                </a:extLst>
+              </a:tr>
+              <a:tr h="433611">
+                <a:tc>
+                  <a:txBody>
+                    <a:bodyPr/>
+                    <a:lstStyle/>
+                    <a:p>
+                      <a:pPr marL="0" marR="0" lvl="0" indent="0" algn="l" defTabSz="914400" rtl="0" eaLnBrk="1" fontAlgn="auto" latinLnBrk="0" hangingPunct="1">
+                        <a:lnSpc>
+                          <a:spcPct val="100000"/>
+                        </a:lnSpc>
+                        <a:spcBef>
+                          <a:spcPts val="0"/>
+                        </a:spcBef>
+                        <a:spcAft>
+                          <a:spcPts val="0"/>
+                        </a:spcAft>
+                        <a:buClrTx/>
+                        <a:buSzTx/>
+                        <a:buFontTx/>
+                        <a:buNone/>
+                        <a:tabLst/>
+                        <a:defRPr/>
+                      </a:pPr>
+                      <a:r>
+                        <a:rPr lang="en-US" dirty="0"/>
+                        <a:t>Portability</a:t>
+                      </a:r>
+                    </a:p>
+                  </a:txBody>
+                  <a:tcPr/>
+                </a:tc>
+                <a:tc>
+                  <a:txBody>
+                    <a:bodyPr/>
+                    <a:lstStyle/>
+                    <a:p>
+                      <a:pPr algn="ctr"/>
+                      <a:endParaRPr lang="en-US"/>
+                    </a:p>
+                  </a:txBody>
+                  <a:tcPr/>
+                </a:tc>
+                <a:tc>
+                  <a:txBody>
+                    <a:bodyPr/>
+                    <a:lstStyle/>
+                    <a:p>
+                      <a:pPr algn="ctr"/>
+                      <a:endParaRPr lang="en-US" dirty="0"/>
+                    </a:p>
+                  </a:txBody>
+                  <a:tcPr/>
+                </a:tc>
+                <a:tc>
+                  <a:txBody>
+                    <a:bodyPr/>
+                    <a:lstStyle/>
+                    <a:p>
+                      <a:pPr algn="ctr"/>
+                      <a:endParaRPr lang="en-US" dirty="0"/>
+                    </a:p>
+                  </a:txBody>
+                  <a:tcPr/>
+                </a:tc>
+                <a:extLst>
+                  <a:ext uri="{0D108BD9-81ED-4DB2-BD59-A6C34878D82A}">
+                    <a16:rowId xmlns:a16="http://schemas.microsoft.com/office/drawing/2014/main" val="3646000717"/>
+                  </a:ext>
+                </a:extLst>
+              </a:tr>
+              <a:tr h="433611">
+                <a:tc>
+                  <a:txBody>
+                    <a:bodyPr/>
+                    <a:lstStyle/>
+                    <a:p>
+                      <a:pPr marL="0" marR="0" lvl="0" indent="0" algn="l" defTabSz="914400" rtl="0" eaLnBrk="1" fontAlgn="auto" latinLnBrk="0" hangingPunct="1">
+                        <a:lnSpc>
+                          <a:spcPct val="100000"/>
+                        </a:lnSpc>
+                        <a:spcBef>
+                          <a:spcPts val="0"/>
+                        </a:spcBef>
+                        <a:spcAft>
+                          <a:spcPts val="0"/>
+                        </a:spcAft>
+                        <a:buClrTx/>
+                        <a:buSzTx/>
+                        <a:buFontTx/>
+                        <a:buNone/>
+                        <a:tabLst/>
+                        <a:defRPr/>
+                      </a:pPr>
+                      <a:r>
+                        <a:rPr lang="en-US" dirty="0"/>
+                        <a:t>Domain Separation</a:t>
+                      </a:r>
+                    </a:p>
+                  </a:txBody>
+                  <a:tcPr/>
+                </a:tc>
+                <a:tc>
+                  <a:txBody>
+                    <a:bodyPr/>
+                    <a:lstStyle/>
+                    <a:p>
+                      <a:pPr algn="ctr"/>
+                      <a:endParaRPr lang="en-US"/>
+                    </a:p>
+                  </a:txBody>
+                  <a:tcPr/>
+                </a:tc>
+                <a:tc>
+                  <a:txBody>
+                    <a:bodyPr/>
+                    <a:lstStyle/>
+                    <a:p>
+                      <a:pPr algn="ctr"/>
+                      <a:endParaRPr lang="en-US" dirty="0"/>
+                    </a:p>
+                  </a:txBody>
+                  <a:tcPr/>
+                </a:tc>
+                <a:tc>
+                  <a:txBody>
+                    <a:bodyPr/>
+                    <a:lstStyle/>
+                    <a:p>
+                      <a:pPr algn="ctr"/>
+                      <a:endParaRPr lang="en-US" dirty="0"/>
+                    </a:p>
+                  </a:txBody>
+                  <a:tcPr/>
+                </a:tc>
+                <a:extLst>
+                  <a:ext uri="{0D108BD9-81ED-4DB2-BD59-A6C34878D82A}">
+                    <a16:rowId xmlns:a16="http://schemas.microsoft.com/office/drawing/2014/main" val="1724178245"/>
+                  </a:ext>
+                </a:extLst>
+              </a:tr>
+              <a:tr h="433611">
+                <a:tc>
+                  <a:txBody>
+                    <a:bodyPr/>
+                    <a:lstStyle/>
+                    <a:p>
+                      <a:pPr marL="0" marR="0" lvl="0" indent="0" algn="l" defTabSz="914400" rtl="0" eaLnBrk="1" fontAlgn="auto" latinLnBrk="0" hangingPunct="1">
+                        <a:lnSpc>
+                          <a:spcPct val="100000"/>
+                        </a:lnSpc>
+                        <a:spcBef>
+                          <a:spcPts val="0"/>
+                        </a:spcBef>
+                        <a:spcAft>
+                          <a:spcPts val="0"/>
+                        </a:spcAft>
+                        <a:buClrTx/>
+                        <a:buSzTx/>
+                        <a:buFontTx/>
+                        <a:buNone/>
+                        <a:tabLst/>
+                        <a:defRPr/>
+                      </a:pPr>
+                      <a:r>
+                        <a:rPr lang="en-US" dirty="0"/>
+                        <a:t>Optimize instructions</a:t>
+                      </a:r>
+                    </a:p>
+                  </a:txBody>
+                  <a:tcPr/>
+                </a:tc>
+                <a:tc>
+                  <a:txBody>
+                    <a:bodyPr/>
+                    <a:lstStyle/>
+                    <a:p>
+                      <a:pPr algn="ctr"/>
+                      <a:endParaRPr lang="en-US"/>
+                    </a:p>
+                  </a:txBody>
+                  <a:tcPr/>
+                </a:tc>
+                <a:tc>
+                  <a:txBody>
+                    <a:bodyPr/>
+                    <a:lstStyle/>
+                    <a:p>
+                      <a:pPr algn="ctr"/>
+                      <a:endParaRPr lang="en-US" dirty="0"/>
+                    </a:p>
+                  </a:txBody>
+                  <a:tcPr/>
+                </a:tc>
+                <a:tc>
+                  <a:txBody>
+                    <a:bodyPr/>
+                    <a:lstStyle/>
+                    <a:p>
+                      <a:pPr algn="ctr"/>
+                      <a:endParaRPr lang="en-US" dirty="0"/>
+                    </a:p>
+                  </a:txBody>
+                  <a:tcPr/>
+                </a:tc>
+                <a:extLst>
+                  <a:ext uri="{0D108BD9-81ED-4DB2-BD59-A6C34878D82A}">
+                    <a16:rowId xmlns:a16="http://schemas.microsoft.com/office/drawing/2014/main" val="2222090049"/>
+                  </a:ext>
+                </a:extLst>
+              </a:tr>
+            </a:tbl>
+          </a:graphicData>
+        </a:graphic>
+      </p:graphicFrame>
+    </p:spTree>
+    <p:extLst>
+      <p:ext uri="{BB962C8B-B14F-4D97-AF65-F5344CB8AC3E}">
+        <p14:creationId xmlns:p14="http://schemas.microsoft.com/office/powerpoint/2010/main" val="949708230"/>
+      </p:ext>
+    </p:extLst>
+  </p:cSld>
+  <p:clrMapOvr>
+    <a:masterClrMapping/>
+  </p:clrMapOvr>
+</p:sld>
+</file>
+
+<file path=ppt/slides/slide21.xml><?xml version="1.0" encoding="utf-8"?>
+<p:sld xmlns:a="http://schemas.openxmlformats.org/drawingml/2006/main" xmlns:r="http://schemas.openxmlformats.org/officeDocument/2006/relationships" xmlns:p="http://schemas.openxmlformats.org/presentationml/2006/main">
+  <p:cSld>
+    <p:spTree>
+      <p:nvGrpSpPr>
+        <p:cNvPr id="1" name=""/>
+        <p:cNvGrpSpPr/>
+        <p:nvPr/>
+      </p:nvGrpSpPr>
+      <p:grpSpPr>
+        <a:xfrm>
+          <a:off x="0" y="0"/>
+          <a:ext cx="0" cy="0"/>
+          <a:chOff x="0" y="0"/>
+          <a:chExt cx="0" cy="0"/>
+        </a:xfrm>
+      </p:grpSpPr>
+      <p:sp>
+        <p:nvSpPr>
+          <p:cNvPr id="2" name="Title 1">
+            <a:extLst>
+              <a:ext uri="{FF2B5EF4-FFF2-40B4-BE49-F238E27FC236}">
+                <a16:creationId xmlns:a16="http://schemas.microsoft.com/office/drawing/2014/main" id="{2111952D-B44C-48C8-89A9-40501DF41C2F}"/>
+              </a:ext>
+            </a:extLst>
+          </p:cNvPr>
+          <p:cNvSpPr>
+            <a:spLocks noGrp="1"/>
+          </p:cNvSpPr>
+          <p:nvPr>
+            <p:ph type="title"/>
+          </p:nvPr>
+        </p:nvSpPr>
+        <p:spPr/>
+        <p:txBody>
+          <a:bodyPr/>
+          <a:lstStyle/>
+          <a:p>
+            <a:r>
+              <a:rPr lang="en-US" dirty="0"/>
+              <a:t>Why Q#</a:t>
+            </a:r>
+          </a:p>
+        </p:txBody>
+      </p:sp>
+      <p:graphicFrame>
+        <p:nvGraphicFramePr>
+          <p:cNvPr id="4" name="Table 4">
+            <a:extLst>
+              <a:ext uri="{FF2B5EF4-FFF2-40B4-BE49-F238E27FC236}">
+                <a16:creationId xmlns:a16="http://schemas.microsoft.com/office/drawing/2014/main" id="{8C52BC27-5BFD-47D8-9C91-0C1CAA55EDBD}"/>
+              </a:ext>
+            </a:extLst>
+          </p:cNvPr>
+          <p:cNvGraphicFramePr>
+            <a:graphicFrameLocks noGrp="1"/>
+          </p:cNvGraphicFramePr>
+          <p:nvPr>
+            <p:extLst>
+              <p:ext uri="{D42A27DB-BD31-4B8C-83A1-F6EECF244321}">
+                <p14:modId xmlns:p14="http://schemas.microsoft.com/office/powerpoint/2010/main" val="1776724218"/>
+              </p:ext>
+            </p:extLst>
+          </p:nvPr>
+        </p:nvGraphicFramePr>
+        <p:xfrm>
+          <a:off x="1097280" y="1961726"/>
+          <a:ext cx="10058400" cy="3354847"/>
+        </p:xfrm>
+        <a:graphic>
+          <a:graphicData uri="http://schemas.openxmlformats.org/drawingml/2006/table">
+            <a:tbl>
+              <a:tblPr firstRow="1" bandRow="1">
+                <a:tableStyleId>{9D7B26C5-4107-4FEC-AEDC-1716B250A1EF}</a:tableStyleId>
+              </a:tblPr>
+              <a:tblGrid>
+                <a:gridCol w="2514600">
+                  <a:extLst>
+                    <a:ext uri="{9D8B030D-6E8A-4147-A177-3AD203B41FA5}">
+                      <a16:colId xmlns:a16="http://schemas.microsoft.com/office/drawing/2014/main" val="85520031"/>
+                    </a:ext>
+                  </a:extLst>
+                </a:gridCol>
+                <a:gridCol w="2514600">
+                  <a:extLst>
+                    <a:ext uri="{9D8B030D-6E8A-4147-A177-3AD203B41FA5}">
+                      <a16:colId xmlns:a16="http://schemas.microsoft.com/office/drawing/2014/main" val="1803248223"/>
+                    </a:ext>
+                  </a:extLst>
+                </a:gridCol>
+                <a:gridCol w="2514600">
+                  <a:extLst>
+                    <a:ext uri="{9D8B030D-6E8A-4147-A177-3AD203B41FA5}">
+                      <a16:colId xmlns:a16="http://schemas.microsoft.com/office/drawing/2014/main" val="3792684937"/>
+                    </a:ext>
+                  </a:extLst>
+                </a:gridCol>
+                <a:gridCol w="2514600">
+                  <a:extLst>
+                    <a:ext uri="{9D8B030D-6E8A-4147-A177-3AD203B41FA5}">
+                      <a16:colId xmlns:a16="http://schemas.microsoft.com/office/drawing/2014/main" val="101123046"/>
+                    </a:ext>
+                  </a:extLst>
+                </a:gridCol>
+              </a:tblGrid>
+              <a:tr h="748425">
+                <a:tc>
+                  <a:txBody>
+                    <a:bodyPr/>
+                    <a:lstStyle/>
+                    <a:p>
+                      <a:endParaRPr lang="en-US" dirty="0"/>
+                    </a:p>
+                  </a:txBody>
+                  <a:tcPr/>
+                </a:tc>
+                <a:tc>
+                  <a:txBody>
+                    <a:bodyPr/>
+                    <a:lstStyle/>
+                    <a:p>
+                      <a:pPr algn="ctr"/>
+                      <a:r>
+                        <a:rPr lang="en-US" dirty="0"/>
+                        <a:t>Circuits</a:t>
+                      </a:r>
+                    </a:p>
+                  </a:txBody>
+                  <a:tcPr/>
+                </a:tc>
+                <a:tc>
+                  <a:txBody>
+                    <a:bodyPr/>
+                    <a:lstStyle/>
+                    <a:p>
+                      <a:pPr algn="ctr"/>
+                      <a:r>
+                        <a:rPr lang="en-US" dirty="0"/>
+                        <a:t>Host Language w/Libraries</a:t>
+                      </a:r>
+                    </a:p>
+                  </a:txBody>
+                  <a:tcPr/>
+                </a:tc>
+                <a:tc>
+                  <a:txBody>
+                    <a:bodyPr/>
+                    <a:lstStyle/>
+                    <a:p>
+                      <a:pPr algn="ctr"/>
+                      <a:endParaRPr lang="en-US" dirty="0"/>
+                    </a:p>
+                  </a:txBody>
+                  <a:tcPr/>
+                </a:tc>
+                <a:extLst>
+                  <a:ext uri="{0D108BD9-81ED-4DB2-BD59-A6C34878D82A}">
+                    <a16:rowId xmlns:a16="http://schemas.microsoft.com/office/drawing/2014/main" val="2277476467"/>
+                  </a:ext>
+                </a:extLst>
+              </a:tr>
+              <a:tr h="748425">
+                <a:tc>
+                  <a:txBody>
+                    <a:bodyPr/>
+                    <a:lstStyle/>
+                    <a:p>
+                      <a:pPr marL="0" marR="0" lvl="0" indent="0" algn="l" defTabSz="914400" rtl="0" eaLnBrk="1" fontAlgn="auto" latinLnBrk="0" hangingPunct="1">
+                        <a:lnSpc>
+                          <a:spcPct val="100000"/>
+                        </a:lnSpc>
+                        <a:spcBef>
+                          <a:spcPts val="0"/>
+                        </a:spcBef>
+                        <a:spcAft>
+                          <a:spcPts val="0"/>
+                        </a:spcAft>
+                        <a:buClrTx/>
+                        <a:buSzTx/>
+                        <a:buFontTx/>
+                        <a:buNone/>
+                        <a:tabLst/>
+                        <a:defRPr/>
+                      </a:pPr>
+                      <a:r>
+                        <a:rPr lang="en-US" dirty="0"/>
+                        <a:t>Expressing Computation</a:t>
+                      </a:r>
+                    </a:p>
+                  </a:txBody>
+                  <a:tcPr/>
+                </a:tc>
+                <a:tc>
+                  <a:txBody>
+                    <a:bodyPr/>
+                    <a:lstStyle/>
+                    <a:p>
+                      <a:pPr algn="ctr"/>
+                      <a:r>
+                        <a:rPr lang="en-US" dirty="0"/>
+                        <a:t>X</a:t>
+                      </a:r>
+                    </a:p>
+                  </a:txBody>
+                  <a:tcPr/>
+                </a:tc>
+                <a:tc>
+                  <a:txBody>
+                    <a:bodyPr/>
+                    <a:lstStyle/>
+                    <a:p>
+                      <a:pPr algn="ctr"/>
+                      <a:r>
+                        <a:rPr lang="en-US" dirty="0"/>
+                        <a:t>X</a:t>
+                      </a:r>
+                    </a:p>
+                  </a:txBody>
+                  <a:tcPr/>
+                </a:tc>
+                <a:tc>
+                  <a:txBody>
+                    <a:bodyPr/>
+                    <a:lstStyle/>
+                    <a:p>
+                      <a:pPr algn="ctr"/>
+                      <a:endParaRPr lang="en-US" dirty="0"/>
+                    </a:p>
+                  </a:txBody>
+                  <a:tcPr/>
+                </a:tc>
+                <a:extLst>
+                  <a:ext uri="{0D108BD9-81ED-4DB2-BD59-A6C34878D82A}">
+                    <a16:rowId xmlns:a16="http://schemas.microsoft.com/office/drawing/2014/main" val="2203355882"/>
+                  </a:ext>
+                </a:extLst>
+              </a:tr>
+              <a:tr h="557164">
+                <a:tc>
+                  <a:txBody>
+                    <a:bodyPr/>
+                    <a:lstStyle/>
+                    <a:p>
+                      <a:pPr marL="0" marR="0" lvl="0" indent="0" algn="l" defTabSz="914400" rtl="0" eaLnBrk="1" fontAlgn="auto" latinLnBrk="0" hangingPunct="1">
+                        <a:lnSpc>
+                          <a:spcPct val="100000"/>
+                        </a:lnSpc>
+                        <a:spcBef>
+                          <a:spcPts val="0"/>
+                        </a:spcBef>
+                        <a:spcAft>
+                          <a:spcPts val="0"/>
+                        </a:spcAft>
+                        <a:buClrTx/>
+                        <a:buSzTx/>
+                        <a:buFontTx/>
+                        <a:buNone/>
+                        <a:tabLst/>
+                        <a:defRPr/>
+                      </a:pPr>
+                      <a:r>
+                        <a:rPr lang="en-US" dirty="0"/>
+                        <a:t>Parameters</a:t>
+                      </a:r>
+                    </a:p>
+                  </a:txBody>
+                  <a:tcPr/>
+                </a:tc>
+                <a:tc>
+                  <a:txBody>
+                    <a:bodyPr/>
+                    <a:lstStyle/>
+                    <a:p>
+                      <a:pPr algn="ctr"/>
+                      <a:endParaRPr lang="en-US"/>
+                    </a:p>
+                  </a:txBody>
+                  <a:tcPr/>
+                </a:tc>
+                <a:tc>
+                  <a:txBody>
+                    <a:bodyPr/>
+                    <a:lstStyle/>
+                    <a:p>
+                      <a:pPr algn="ctr"/>
+                      <a:r>
+                        <a:rPr lang="en-US" dirty="0"/>
+                        <a:t>X</a:t>
+                      </a:r>
+                    </a:p>
+                  </a:txBody>
+                  <a:tcPr/>
+                </a:tc>
+                <a:tc>
+                  <a:txBody>
+                    <a:bodyPr/>
+                    <a:lstStyle/>
+                    <a:p>
+                      <a:pPr algn="ctr"/>
+                      <a:endParaRPr lang="en-US" dirty="0"/>
+                    </a:p>
+                  </a:txBody>
+                  <a:tcPr/>
+                </a:tc>
+                <a:extLst>
+                  <a:ext uri="{0D108BD9-81ED-4DB2-BD59-A6C34878D82A}">
+                    <a16:rowId xmlns:a16="http://schemas.microsoft.com/office/drawing/2014/main" val="2482598920"/>
+                  </a:ext>
+                </a:extLst>
+              </a:tr>
+              <a:tr h="433611">
+                <a:tc>
+                  <a:txBody>
+                    <a:bodyPr/>
+                    <a:lstStyle/>
+                    <a:p>
+                      <a:pPr marL="0" marR="0" lvl="0" indent="0" algn="l" defTabSz="914400" rtl="0" eaLnBrk="1" fontAlgn="auto" latinLnBrk="0" hangingPunct="1">
+                        <a:lnSpc>
+                          <a:spcPct val="100000"/>
+                        </a:lnSpc>
+                        <a:spcBef>
+                          <a:spcPts val="0"/>
+                        </a:spcBef>
+                        <a:spcAft>
+                          <a:spcPts val="0"/>
+                        </a:spcAft>
+                        <a:buClrTx/>
+                        <a:buSzTx/>
+                        <a:buFontTx/>
+                        <a:buNone/>
+                        <a:tabLst/>
+                        <a:defRPr/>
+                      </a:pPr>
+                      <a:r>
+                        <a:rPr lang="en-US" dirty="0"/>
+                        <a:t>Portability</a:t>
+                      </a:r>
+                    </a:p>
+                  </a:txBody>
+                  <a:tcPr/>
+                </a:tc>
+                <a:tc>
+                  <a:txBody>
+                    <a:bodyPr/>
+                    <a:lstStyle/>
+                    <a:p>
+                      <a:pPr algn="ctr"/>
+                      <a:endParaRPr lang="en-US"/>
+                    </a:p>
+                  </a:txBody>
+                  <a:tcPr/>
+                </a:tc>
+                <a:tc>
+                  <a:txBody>
+                    <a:bodyPr/>
+                    <a:lstStyle/>
+                    <a:p>
+                      <a:pPr algn="ctr"/>
+                      <a:r>
+                        <a:rPr lang="en-US" dirty="0"/>
+                        <a:t>X</a:t>
+                      </a:r>
+                    </a:p>
+                  </a:txBody>
+                  <a:tcPr/>
+                </a:tc>
+                <a:tc>
+                  <a:txBody>
+                    <a:bodyPr/>
+                    <a:lstStyle/>
+                    <a:p>
+                      <a:pPr algn="ctr"/>
+                      <a:endParaRPr lang="en-US" dirty="0"/>
+                    </a:p>
+                  </a:txBody>
+                  <a:tcPr/>
+                </a:tc>
+                <a:extLst>
+                  <a:ext uri="{0D108BD9-81ED-4DB2-BD59-A6C34878D82A}">
+                    <a16:rowId xmlns:a16="http://schemas.microsoft.com/office/drawing/2014/main" val="3646000717"/>
+                  </a:ext>
+                </a:extLst>
+              </a:tr>
+              <a:tr h="433611">
+                <a:tc>
+                  <a:txBody>
+                    <a:bodyPr/>
+                    <a:lstStyle/>
+                    <a:p>
+                      <a:pPr marL="0" marR="0" lvl="0" indent="0" algn="l" defTabSz="914400" rtl="0" eaLnBrk="1" fontAlgn="auto" latinLnBrk="0" hangingPunct="1">
+                        <a:lnSpc>
+                          <a:spcPct val="100000"/>
+                        </a:lnSpc>
+                        <a:spcBef>
+                          <a:spcPts val="0"/>
+                        </a:spcBef>
+                        <a:spcAft>
+                          <a:spcPts val="0"/>
+                        </a:spcAft>
+                        <a:buClrTx/>
+                        <a:buSzTx/>
+                        <a:buFontTx/>
+                        <a:buNone/>
+                        <a:tabLst/>
+                        <a:defRPr/>
+                      </a:pPr>
+                      <a:r>
+                        <a:rPr lang="en-US" dirty="0"/>
+                        <a:t>Domain Separation</a:t>
+                      </a:r>
+                    </a:p>
+                  </a:txBody>
+                  <a:tcPr/>
+                </a:tc>
+                <a:tc>
+                  <a:txBody>
+                    <a:bodyPr/>
+                    <a:lstStyle/>
+                    <a:p>
+                      <a:pPr algn="ctr"/>
+                      <a:endParaRPr lang="en-US"/>
+                    </a:p>
+                  </a:txBody>
+                  <a:tcPr/>
+                </a:tc>
+                <a:tc>
+                  <a:txBody>
+                    <a:bodyPr/>
+                    <a:lstStyle/>
+                    <a:p>
+                      <a:pPr algn="ctr"/>
+                      <a:endParaRPr lang="en-US" dirty="0"/>
+                    </a:p>
+                  </a:txBody>
+                  <a:tcPr/>
+                </a:tc>
+                <a:tc>
+                  <a:txBody>
+                    <a:bodyPr/>
+                    <a:lstStyle/>
+                    <a:p>
+                      <a:pPr algn="ctr"/>
+                      <a:endParaRPr lang="en-US" dirty="0"/>
+                    </a:p>
+                  </a:txBody>
+                  <a:tcPr/>
+                </a:tc>
+                <a:extLst>
+                  <a:ext uri="{0D108BD9-81ED-4DB2-BD59-A6C34878D82A}">
+                    <a16:rowId xmlns:a16="http://schemas.microsoft.com/office/drawing/2014/main" val="1724178245"/>
+                  </a:ext>
+                </a:extLst>
+              </a:tr>
+              <a:tr h="433611">
+                <a:tc>
+                  <a:txBody>
+                    <a:bodyPr/>
+                    <a:lstStyle/>
+                    <a:p>
+                      <a:pPr marL="0" marR="0" lvl="0" indent="0" algn="l" defTabSz="914400" rtl="0" eaLnBrk="1" fontAlgn="auto" latinLnBrk="0" hangingPunct="1">
+                        <a:lnSpc>
+                          <a:spcPct val="100000"/>
+                        </a:lnSpc>
+                        <a:spcBef>
+                          <a:spcPts val="0"/>
+                        </a:spcBef>
+                        <a:spcAft>
+                          <a:spcPts val="0"/>
+                        </a:spcAft>
+                        <a:buClrTx/>
+                        <a:buSzTx/>
+                        <a:buFontTx/>
+                        <a:buNone/>
+                        <a:tabLst/>
+                        <a:defRPr/>
+                      </a:pPr>
+                      <a:r>
+                        <a:rPr lang="en-US" dirty="0"/>
+                        <a:t>Optimize instructions</a:t>
+                      </a:r>
+                    </a:p>
+                  </a:txBody>
+                  <a:tcPr/>
+                </a:tc>
+                <a:tc>
+                  <a:txBody>
+                    <a:bodyPr/>
+                    <a:lstStyle/>
+                    <a:p>
+                      <a:pPr algn="ctr"/>
+                      <a:endParaRPr lang="en-US"/>
+                    </a:p>
+                  </a:txBody>
+                  <a:tcPr/>
+                </a:tc>
+                <a:tc>
+                  <a:txBody>
+                    <a:bodyPr/>
+                    <a:lstStyle/>
+                    <a:p>
+                      <a:pPr algn="ctr"/>
+                      <a:endParaRPr lang="en-US" dirty="0"/>
+                    </a:p>
+                  </a:txBody>
+                  <a:tcPr/>
+                </a:tc>
+                <a:tc>
+                  <a:txBody>
+                    <a:bodyPr/>
+                    <a:lstStyle/>
+                    <a:p>
+                      <a:pPr algn="ctr"/>
+                      <a:endParaRPr lang="en-US" dirty="0"/>
+                    </a:p>
+                  </a:txBody>
+                  <a:tcPr/>
+                </a:tc>
+                <a:extLst>
+                  <a:ext uri="{0D108BD9-81ED-4DB2-BD59-A6C34878D82A}">
+                    <a16:rowId xmlns:a16="http://schemas.microsoft.com/office/drawing/2014/main" val="2222090049"/>
+                  </a:ext>
+                </a:extLst>
+              </a:tr>
+            </a:tbl>
+          </a:graphicData>
+        </a:graphic>
+      </p:graphicFrame>
+    </p:spTree>
+    <p:extLst>
+      <p:ext uri="{BB962C8B-B14F-4D97-AF65-F5344CB8AC3E}">
+        <p14:creationId xmlns:p14="http://schemas.microsoft.com/office/powerpoint/2010/main" val="1038771286"/>
+      </p:ext>
+    </p:extLst>
+  </p:cSld>
+  <p:clrMapOvr>
+    <a:masterClrMapping/>
+  </p:clrMapOvr>
+</p:sld>
+</file>
+
+<file path=ppt/slides/slide22.xml><?xml version="1.0" encoding="utf-8"?>
+<p:sld xmlns:a="http://schemas.openxmlformats.org/drawingml/2006/main" xmlns:r="http://schemas.openxmlformats.org/officeDocument/2006/relationships" xmlns:p="http://schemas.openxmlformats.org/presentationml/2006/main">
+  <p:cSld>
+    <p:spTree>
+      <p:nvGrpSpPr>
+        <p:cNvPr id="1" name=""/>
+        <p:cNvGrpSpPr/>
+        <p:nvPr/>
+      </p:nvGrpSpPr>
+      <p:grpSpPr>
+        <a:xfrm>
+          <a:off x="0" y="0"/>
+          <a:ext cx="0" cy="0"/>
+          <a:chOff x="0" y="0"/>
+          <a:chExt cx="0" cy="0"/>
+        </a:xfrm>
+      </p:grpSpPr>
+      <p:sp>
+        <p:nvSpPr>
+          <p:cNvPr id="2" name="Title 1">
+            <a:extLst>
+              <a:ext uri="{FF2B5EF4-FFF2-40B4-BE49-F238E27FC236}">
+                <a16:creationId xmlns:a16="http://schemas.microsoft.com/office/drawing/2014/main" id="{2111952D-B44C-48C8-89A9-40501DF41C2F}"/>
+              </a:ext>
+            </a:extLst>
+          </p:cNvPr>
+          <p:cNvSpPr>
+            <a:spLocks noGrp="1"/>
+          </p:cNvSpPr>
+          <p:nvPr>
+            <p:ph type="title"/>
+          </p:nvPr>
+        </p:nvSpPr>
+        <p:spPr/>
+        <p:txBody>
+          <a:bodyPr/>
+          <a:lstStyle/>
+          <a:p>
+            <a:r>
+              <a:rPr lang="en-US" dirty="0"/>
+              <a:t>Why Q#</a:t>
+            </a:r>
+          </a:p>
+        </p:txBody>
+      </p:sp>
+      <p:graphicFrame>
+        <p:nvGraphicFramePr>
+          <p:cNvPr id="4" name="Table 4">
+            <a:extLst>
+              <a:ext uri="{FF2B5EF4-FFF2-40B4-BE49-F238E27FC236}">
+                <a16:creationId xmlns:a16="http://schemas.microsoft.com/office/drawing/2014/main" id="{8C52BC27-5BFD-47D8-9C91-0C1CAA55EDBD}"/>
+              </a:ext>
+            </a:extLst>
+          </p:cNvPr>
+          <p:cNvGraphicFramePr>
+            <a:graphicFrameLocks noGrp="1"/>
+          </p:cNvGraphicFramePr>
+          <p:nvPr/>
         </p:nvGraphicFramePr>
         <p:xfrm>
           <a:off x="1097280" y="1961726"/>
@@ -9604,7 +10669,7 @@
                       </a:pPr>
                       <a:r>
                         <a:rPr lang="en-US" dirty="0"/>
-                        <a:t>Strict Reasoning</a:t>
+                        <a:t>Optimize instructions</a:t>
                       </a:r>
                     </a:p>
                   </a:txBody>
@@ -9659,7 +10724,7 @@
     </p:spTree>
     <p:extLst>
       <p:ext uri="{BB962C8B-B14F-4D97-AF65-F5344CB8AC3E}">
-        <p14:creationId xmlns:p14="http://schemas.microsoft.com/office/powerpoint/2010/main" val="949708230"/>
+        <p14:creationId xmlns:p14="http://schemas.microsoft.com/office/powerpoint/2010/main" val="3959510779"/>
       </p:ext>
     </p:extLst>
   </p:cSld>
@@ -9669,7 +10734,7 @@
 </p:sld>
 </file>
 
-<file path=ppt/slides/slide21.xml><?xml version="1.0" encoding="utf-8"?>
+<file path=ppt/slides/slide23.xml><?xml version="1.0" encoding="utf-8"?>
 <p:sld xmlns:a="http://schemas.openxmlformats.org/drawingml/2006/main" xmlns:r="http://schemas.openxmlformats.org/officeDocument/2006/relationships" xmlns:p="http://schemas.openxmlformats.org/presentationml/2006/main">
   <p:cSld>
     <p:spTree>
@@ -9737,7 +10802,13 @@
           <a:p>
             <a:r>
               <a:rPr lang="en-US" dirty="0"/>
-              <a:t>The task of estimating the eigenvalue of an eigenvector of a unitary operator. Since the absolute value of the eigenvalue is always 1, the eigenvalue can be represented as exp(2iπφ), and phase estimation algorithms are usually formulated in terms of estimating the phase φ.</a:t>
+              <a:t>The task of estimating the eigenvalue of an eigenvector of a unitary operator. </a:t>
+            </a:r>
+          </a:p>
+          <a:p>
+            <a:r>
+              <a:rPr lang="en-US" dirty="0"/>
+              <a:t>Since the absolute value of the eigenvalue is always 1, the eigenvalue can be represented as exp(2iπφ), and phase estimation algorithms are usually formulated in terms of estimating the phase φ.</a:t>
             </a:r>
           </a:p>
         </p:txBody>
@@ -9755,7 +10826,7 @@
 </p:sld>
 </file>
 
-<file path=ppt/slides/slide22.xml><?xml version="1.0" encoding="utf-8"?>
+<file path=ppt/slides/slide24.xml><?xml version="1.0" encoding="utf-8"?>
 <p:sld xmlns:a="http://schemas.openxmlformats.org/drawingml/2006/main" xmlns:r="http://schemas.openxmlformats.org/officeDocument/2006/relationships" xmlns:p="http://schemas.openxmlformats.org/presentationml/2006/main">
   <p:cSld>
     <p:spTree>
@@ -9815,7 +10886,7 @@
 </p:sld>
 </file>
 
-<file path=ppt/slides/slide23.xml><?xml version="1.0" encoding="utf-8"?>
+<file path=ppt/slides/slide25.xml><?xml version="1.0" encoding="utf-8"?>
 <p:sld xmlns:a="http://schemas.openxmlformats.org/drawingml/2006/main" xmlns:r="http://schemas.openxmlformats.org/officeDocument/2006/relationships" xmlns:p="http://schemas.openxmlformats.org/presentationml/2006/main">
   <p:cSld>
     <p:spTree>
@@ -9931,6 +11002,224 @@
     <p:extLst>
       <p:ext uri="{BB962C8B-B14F-4D97-AF65-F5344CB8AC3E}">
         <p14:creationId xmlns:p14="http://schemas.microsoft.com/office/powerpoint/2010/main" val="2925969042"/>
+      </p:ext>
+    </p:extLst>
+  </p:cSld>
+  <p:clrMapOvr>
+    <a:masterClrMapping/>
+  </p:clrMapOvr>
+</p:sld>
+</file>
+
+<file path=ppt/slides/slide26.xml><?xml version="1.0" encoding="utf-8"?>
+<p:sld xmlns:a="http://schemas.openxmlformats.org/drawingml/2006/main" xmlns:r="http://schemas.openxmlformats.org/officeDocument/2006/relationships" xmlns:p="http://schemas.openxmlformats.org/presentationml/2006/main">
+  <p:cSld>
+    <p:spTree>
+      <p:nvGrpSpPr>
+        <p:cNvPr id="1" name=""/>
+        <p:cNvGrpSpPr/>
+        <p:nvPr/>
+      </p:nvGrpSpPr>
+      <p:grpSpPr>
+        <a:xfrm>
+          <a:off x="0" y="0"/>
+          <a:ext cx="0" cy="0"/>
+          <a:chOff x="0" y="0"/>
+          <a:chExt cx="0" cy="0"/>
+        </a:xfrm>
+      </p:grpSpPr>
+      <p:sp>
+        <p:nvSpPr>
+          <p:cNvPr id="2" name="Title 1">
+            <a:extLst>
+              <a:ext uri="{FF2B5EF4-FFF2-40B4-BE49-F238E27FC236}">
+                <a16:creationId xmlns:a16="http://schemas.microsoft.com/office/drawing/2014/main" id="{9364FB7F-BC93-4D19-9DEE-5688859E69A6}"/>
+              </a:ext>
+            </a:extLst>
+          </p:cNvPr>
+          <p:cNvSpPr>
+            <a:spLocks noGrp="1"/>
+          </p:cNvSpPr>
+          <p:nvPr>
+            <p:ph type="title"/>
+          </p:nvPr>
+        </p:nvSpPr>
+        <p:spPr/>
+        <p:txBody>
+          <a:bodyPr/>
+          <a:lstStyle/>
+          <a:p>
+            <a:r>
+              <a:rPr lang="en-US" dirty="0"/>
+              <a:t>Repositories</a:t>
+            </a:r>
+          </a:p>
+        </p:txBody>
+      </p:sp>
+      <p:sp>
+        <p:nvSpPr>
+          <p:cNvPr id="3" name="Content Placeholder 2">
+            <a:extLst>
+              <a:ext uri="{FF2B5EF4-FFF2-40B4-BE49-F238E27FC236}">
+                <a16:creationId xmlns:a16="http://schemas.microsoft.com/office/drawing/2014/main" id="{3E6AC724-4303-4CA9-A4E6-2A73D203DA7D}"/>
+              </a:ext>
+            </a:extLst>
+          </p:cNvPr>
+          <p:cNvSpPr>
+            <a:spLocks noGrp="1"/>
+          </p:cNvSpPr>
+          <p:nvPr>
+            <p:ph idx="1"/>
+          </p:nvPr>
+        </p:nvSpPr>
+        <p:spPr>
+          <a:xfrm>
+            <a:off x="1097280" y="1845734"/>
+            <a:ext cx="10058400" cy="4023360"/>
+          </a:xfrm>
+        </p:spPr>
+        <p:txBody>
+          <a:bodyPr/>
+          <a:lstStyle/>
+          <a:p>
+            <a:r>
+              <a:rPr lang="en-US" dirty="0"/>
+              <a:t>Compiler: </a:t>
+            </a:r>
+            <a:r>
+              <a:rPr lang="en-US" dirty="0">
+                <a:hlinkClick r:id="rId2"/>
+              </a:rPr>
+              <a:t>https://github.com/microsoft/qsharp-compiler.git</a:t>
+            </a:r>
+            <a:r>
+              <a:rPr lang="en-US" dirty="0"/>
+              <a:t> </a:t>
+            </a:r>
+          </a:p>
+          <a:p>
+            <a:r>
+              <a:rPr lang="en-US" dirty="0"/>
+              <a:t>Simulator: </a:t>
+            </a:r>
+            <a:r>
+              <a:rPr lang="en-US" dirty="0">
+                <a:hlinkClick r:id="rId3"/>
+              </a:rPr>
+              <a:t>https://github.com/microsoft/qsharp-runtime.git</a:t>
+            </a:r>
+            <a:r>
+              <a:rPr lang="en-US" dirty="0"/>
+              <a:t> </a:t>
+            </a:r>
+          </a:p>
+          <a:p>
+            <a:r>
+              <a:rPr lang="en-US" dirty="0"/>
+              <a:t>IQ# (Q# </a:t>
+            </a:r>
+            <a:r>
+              <a:rPr lang="en-US" dirty="0" err="1"/>
+              <a:t>Jupyter</a:t>
+            </a:r>
+            <a:r>
+              <a:rPr lang="en-US" dirty="0"/>
+              <a:t> Kernel): </a:t>
+            </a:r>
+            <a:r>
+              <a:rPr lang="en-US" dirty="0">
+                <a:hlinkClick r:id="rId4"/>
+              </a:rPr>
+              <a:t>https://github.com/microsoft/iqsharp.git</a:t>
+            </a:r>
+            <a:r>
+              <a:rPr lang="en-US" dirty="0"/>
+              <a:t> </a:t>
+            </a:r>
+          </a:p>
+          <a:p>
+            <a:r>
+              <a:rPr lang="en-US" dirty="0"/>
+              <a:t>Libraries: </a:t>
+            </a:r>
+            <a:r>
+              <a:rPr lang="en-US" dirty="0">
+                <a:hlinkClick r:id="rId5"/>
+              </a:rPr>
+              <a:t>https://github.com/Microsoft/QuantumLibraries.git</a:t>
+            </a:r>
+            <a:r>
+              <a:rPr lang="en-US" dirty="0"/>
+              <a:t> </a:t>
+            </a:r>
+          </a:p>
+          <a:p>
+            <a:r>
+              <a:rPr lang="en-US" dirty="0"/>
+              <a:t>Samples: </a:t>
+            </a:r>
+            <a:r>
+              <a:rPr lang="en-US" dirty="0">
+                <a:hlinkClick r:id="rId6"/>
+              </a:rPr>
+              <a:t>https://github.com/Microsoft/Quantum.git</a:t>
+            </a:r>
+            <a:endParaRPr lang="en-US" dirty="0"/>
+          </a:p>
+          <a:p>
+            <a:r>
+              <a:rPr lang="en-US" dirty="0"/>
+              <a:t>All Katas: </a:t>
+            </a:r>
+            <a:r>
+              <a:rPr lang="en-US" dirty="0">
+                <a:hlinkClick r:id="rId7"/>
+              </a:rPr>
+              <a:t>https://github.com/Microsoft/QuantumKatas.git</a:t>
+            </a:r>
+            <a:r>
+              <a:rPr lang="en-US" dirty="0"/>
+              <a:t> </a:t>
+            </a:r>
+          </a:p>
+          <a:p>
+            <a:r>
+              <a:rPr lang="en-US" dirty="0"/>
+              <a:t>Docs: </a:t>
+            </a:r>
+            <a:r>
+              <a:rPr lang="en-US" dirty="0">
+                <a:hlinkClick r:id="rId8"/>
+              </a:rPr>
+              <a:t>https://github.com/microsoftdocs/quantum-docs-pr</a:t>
+            </a:r>
+            <a:endParaRPr lang="en-US" dirty="0"/>
+          </a:p>
+          <a:p>
+            <a:endParaRPr lang="en-US" dirty="0"/>
+          </a:p>
+          <a:p>
+            <a:r>
+              <a:rPr lang="en-US" dirty="0"/>
+              <a:t>This workshop: </a:t>
+            </a:r>
+            <a:r>
+              <a:rPr lang="en-US" dirty="0">
+                <a:hlinkClick r:id="rId9"/>
+              </a:rPr>
+              <a:t>https://github.com/msr-quarc/qldi-workshop-2019.git</a:t>
+            </a:r>
+            <a:r>
+              <a:rPr lang="en-US" dirty="0"/>
+              <a:t> </a:t>
+            </a:r>
+          </a:p>
+        </p:txBody>
+      </p:sp>
+    </p:spTree>
+    <p:extLst>
+      <p:ext uri="{BB962C8B-B14F-4D97-AF65-F5344CB8AC3E}">
+        <p14:creationId xmlns:p14="http://schemas.microsoft.com/office/powerpoint/2010/main" val="3271984247"/>
       </p:ext>
     </p:extLst>
   </p:cSld>

</xml_diff>